<commit_message>
mostly finish unit test deck
</commit_message>
<xml_diff>
--- a/QC Coders - All About Unit Testing.pptx
+++ b/QC Coders - All About Unit Testing.pptx
@@ -10,7 +10,15 @@
     <p:sldId id="264" r:id="rId4"/>
     <p:sldId id="265" r:id="rId5"/>
     <p:sldId id="266" r:id="rId6"/>
-    <p:sldId id="263" r:id="rId7"/>
+    <p:sldId id="267" r:id="rId7"/>
+    <p:sldId id="268" r:id="rId8"/>
+    <p:sldId id="271" r:id="rId9"/>
+    <p:sldId id="269" r:id="rId10"/>
+    <p:sldId id="270" r:id="rId11"/>
+    <p:sldId id="272" r:id="rId12"/>
+    <p:sldId id="273" r:id="rId13"/>
+    <p:sldId id="274" r:id="rId14"/>
+    <p:sldId id="263" r:id="rId15"/>
   </p:sldIdLst>
   <p:sldSz cx="12192000" cy="6858000"/>
   <p:notesSz cx="6858000" cy="9144000"/>
@@ -3880,6 +3888,552 @@
 </p:sld>
 </file>
 
+<file path=ppt/slides/slide10.xml><?xml version="1.0" encoding="utf-8"?>
+<p:sld xmlns:a="http://schemas.openxmlformats.org/drawingml/2006/main" xmlns:r="http://schemas.openxmlformats.org/officeDocument/2006/relationships" xmlns:p="http://schemas.openxmlformats.org/presentationml/2006/main">
+  <p:cSld>
+    <p:spTree>
+      <p:nvGrpSpPr>
+        <p:cNvPr id="1" name=""/>
+        <p:cNvGrpSpPr/>
+        <p:nvPr/>
+      </p:nvGrpSpPr>
+      <p:grpSpPr>
+        <a:xfrm>
+          <a:off x="0" y="0"/>
+          <a:ext cx="0" cy="0"/>
+          <a:chOff x="0" y="0"/>
+          <a:chExt cx="0" cy="0"/>
+        </a:xfrm>
+      </p:grpSpPr>
+      <p:sp>
+        <p:nvSpPr>
+          <p:cNvPr id="2" name="Title 1"/>
+          <p:cNvSpPr>
+            <a:spLocks noGrp="1"/>
+          </p:cNvSpPr>
+          <p:nvPr>
+            <p:ph type="title"/>
+          </p:nvPr>
+        </p:nvSpPr>
+        <p:spPr/>
+        <p:txBody>
+          <a:bodyPr/>
+          <a:lstStyle/>
+          <a:p>
+            <a:r>
+              <a:rPr lang="en-US" dirty="0" smtClean="0"/>
+              <a:t>What About Test Driven Development?</a:t>
+            </a:r>
+            <a:endParaRPr lang="en-US" dirty="0"/>
+          </a:p>
+        </p:txBody>
+      </p:sp>
+      <p:pic>
+        <p:nvPicPr>
+          <p:cNvPr id="4" name="Content Placeholder 3"/>
+          <p:cNvPicPr>
+            <a:picLocks noGrp="1" noChangeAspect="1"/>
+          </p:cNvPicPr>
+          <p:nvPr>
+            <p:ph idx="1"/>
+          </p:nvPr>
+        </p:nvPicPr>
+        <p:blipFill>
+          <a:blip r:embed="rId2" cstate="print">
+            <a:extLst>
+              <a:ext uri="{28A0092B-C50C-407E-A947-70E740481C1C}">
+                <a14:useLocalDpi xmlns:a14="http://schemas.microsoft.com/office/drawing/2010/main" val="0"/>
+              </a:ext>
+            </a:extLst>
+          </a:blip>
+          <a:stretch>
+            <a:fillRect/>
+          </a:stretch>
+        </p:blipFill>
+        <p:spPr>
+          <a:xfrm>
+            <a:off x="3952972" y="2199189"/>
+            <a:ext cx="4347016" cy="4262853"/>
+          </a:xfrm>
+        </p:spPr>
+      </p:pic>
+    </p:spTree>
+    <p:extLst>
+      <p:ext uri="{BB962C8B-B14F-4D97-AF65-F5344CB8AC3E}">
+        <p14:creationId xmlns:p14="http://schemas.microsoft.com/office/powerpoint/2010/main" val="2734935023"/>
+      </p:ext>
+    </p:extLst>
+  </p:cSld>
+  <p:clrMapOvr>
+    <a:masterClrMapping/>
+  </p:clrMapOvr>
+  <p:timing>
+    <p:tnLst>
+      <p:par>
+        <p:cTn id="1" dur="indefinite" restart="never" nodeType="tmRoot"/>
+      </p:par>
+    </p:tnLst>
+  </p:timing>
+</p:sld>
+</file>
+
+<file path=ppt/slides/slide11.xml><?xml version="1.0" encoding="utf-8"?>
+<p:sld xmlns:a="http://schemas.openxmlformats.org/drawingml/2006/main" xmlns:r="http://schemas.openxmlformats.org/officeDocument/2006/relationships" xmlns:p="http://schemas.openxmlformats.org/presentationml/2006/main">
+  <p:cSld>
+    <p:spTree>
+      <p:nvGrpSpPr>
+        <p:cNvPr id="1" name=""/>
+        <p:cNvGrpSpPr/>
+        <p:nvPr/>
+      </p:nvGrpSpPr>
+      <p:grpSpPr>
+        <a:xfrm>
+          <a:off x="0" y="0"/>
+          <a:ext cx="0" cy="0"/>
+          <a:chOff x="0" y="0"/>
+          <a:chExt cx="0" cy="0"/>
+        </a:xfrm>
+      </p:grpSpPr>
+      <p:sp>
+        <p:nvSpPr>
+          <p:cNvPr id="2" name="Title 1"/>
+          <p:cNvSpPr>
+            <a:spLocks noGrp="1"/>
+          </p:cNvSpPr>
+          <p:nvPr>
+            <p:ph type="title"/>
+          </p:nvPr>
+        </p:nvSpPr>
+        <p:spPr/>
+        <p:txBody>
+          <a:bodyPr/>
+          <a:lstStyle/>
+          <a:p>
+            <a:r>
+              <a:rPr lang="en-US" dirty="0" smtClean="0"/>
+              <a:t>What About Test Driven Development?</a:t>
+            </a:r>
+            <a:endParaRPr lang="en-US" dirty="0"/>
+          </a:p>
+        </p:txBody>
+      </p:sp>
+      <p:sp>
+        <p:nvSpPr>
+          <p:cNvPr id="3" name="Content Placeholder 2"/>
+          <p:cNvSpPr>
+            <a:spLocks noGrp="1"/>
+          </p:cNvSpPr>
+          <p:nvPr>
+            <p:ph idx="1"/>
+          </p:nvPr>
+        </p:nvSpPr>
+        <p:spPr/>
+        <p:txBody>
+          <a:bodyPr>
+            <a:normAutofit lnSpcReduction="10000"/>
+          </a:bodyPr>
+          <a:lstStyle/>
+          <a:p>
+            <a:pPr>
+              <a:buFont typeface="Wingdings" panose="05000000000000000000" pitchFamily="2" charset="2"/>
+              <a:buChar char="§"/>
+            </a:pPr>
+            <a:r>
+              <a:rPr lang="en-US" dirty="0" smtClean="0"/>
+              <a:t>  Consider your environment</a:t>
+            </a:r>
+          </a:p>
+          <a:p>
+            <a:pPr lvl="1">
+              <a:buFont typeface="Wingdings" panose="05000000000000000000" pitchFamily="2" charset="2"/>
+              <a:buChar char="§"/>
+            </a:pPr>
+            <a:r>
+              <a:rPr lang="en-US" dirty="0" smtClean="0"/>
+              <a:t>How big is your team?</a:t>
+            </a:r>
+          </a:p>
+          <a:p>
+            <a:pPr lvl="1">
+              <a:buFont typeface="Wingdings" panose="05000000000000000000" pitchFamily="2" charset="2"/>
+              <a:buChar char="§"/>
+            </a:pPr>
+            <a:r>
+              <a:rPr lang="en-US" dirty="0" smtClean="0"/>
+              <a:t>How big is your organization?</a:t>
+            </a:r>
+          </a:p>
+          <a:p>
+            <a:pPr lvl="1">
+              <a:buFont typeface="Wingdings" panose="05000000000000000000" pitchFamily="2" charset="2"/>
+              <a:buChar char="§"/>
+            </a:pPr>
+            <a:r>
+              <a:rPr lang="en-US" dirty="0" smtClean="0"/>
+              <a:t>Is everyone in the same spot physically? In the same time zone? In the same country?</a:t>
+            </a:r>
+          </a:p>
+          <a:p>
+            <a:pPr lvl="1">
+              <a:buFont typeface="Wingdings" panose="05000000000000000000" pitchFamily="2" charset="2"/>
+              <a:buChar char="§"/>
+            </a:pPr>
+            <a:r>
+              <a:rPr lang="en-US" dirty="0" smtClean="0"/>
+              <a:t>How diverse is your team in terms of experience level?  Any other aspects?</a:t>
+            </a:r>
+          </a:p>
+          <a:p>
+            <a:pPr>
+              <a:buFont typeface="Wingdings" panose="05000000000000000000" pitchFamily="2" charset="2"/>
+              <a:buChar char="§"/>
+            </a:pPr>
+            <a:r>
+              <a:rPr lang="en-US" dirty="0"/>
+              <a:t> </a:t>
+            </a:r>
+            <a:r>
+              <a:rPr lang="en-US" dirty="0" smtClean="0"/>
+              <a:t> Consider your system</a:t>
+            </a:r>
+          </a:p>
+          <a:p>
+            <a:pPr lvl="1">
+              <a:buFont typeface="Wingdings" panose="05000000000000000000" pitchFamily="2" charset="2"/>
+              <a:buChar char="§"/>
+            </a:pPr>
+            <a:r>
+              <a:rPr lang="en-US" dirty="0" smtClean="0"/>
+              <a:t>How large/complex is the system you’re working on?</a:t>
+            </a:r>
+          </a:p>
+          <a:p>
+            <a:pPr lvl="1">
+              <a:buFont typeface="Wingdings" panose="05000000000000000000" pitchFamily="2" charset="2"/>
+              <a:buChar char="§"/>
+            </a:pPr>
+            <a:r>
+              <a:rPr lang="en-US" dirty="0" smtClean="0"/>
+              <a:t>How old is your system?</a:t>
+            </a:r>
+          </a:p>
+          <a:p>
+            <a:pPr>
+              <a:buFont typeface="Wingdings" panose="05000000000000000000" pitchFamily="2" charset="2"/>
+              <a:buChar char="§"/>
+            </a:pPr>
+            <a:r>
+              <a:rPr lang="en-US" dirty="0"/>
+              <a:t> </a:t>
+            </a:r>
+            <a:r>
+              <a:rPr lang="en-US" dirty="0" smtClean="0"/>
+              <a:t> Consider your goals</a:t>
+            </a:r>
+          </a:p>
+          <a:p>
+            <a:pPr lvl="1">
+              <a:buFont typeface="Wingdings" panose="05000000000000000000" pitchFamily="2" charset="2"/>
+              <a:buChar char="§"/>
+            </a:pPr>
+            <a:r>
+              <a:rPr lang="en-US" dirty="0" smtClean="0"/>
+              <a:t>Are you working for a startup? Adding features to an enterprise application? Maintaining legacy code?</a:t>
+            </a:r>
+          </a:p>
+          <a:p>
+            <a:pPr>
+              <a:buFont typeface="Wingdings" panose="05000000000000000000" pitchFamily="2" charset="2"/>
+              <a:buChar char="§"/>
+            </a:pPr>
+            <a:r>
+              <a:rPr lang="en-US" dirty="0"/>
+              <a:t> As the overall picture becomes more complex, difficulty in keeping everyone ‘pulling in the same direction’ increases.  </a:t>
+            </a:r>
+            <a:r>
+              <a:rPr lang="en-US" dirty="0" smtClean="0"/>
+              <a:t>TDD can help.</a:t>
+            </a:r>
+          </a:p>
+        </p:txBody>
+      </p:sp>
+    </p:spTree>
+    <p:extLst>
+      <p:ext uri="{BB962C8B-B14F-4D97-AF65-F5344CB8AC3E}">
+        <p14:creationId xmlns:p14="http://schemas.microsoft.com/office/powerpoint/2010/main" val="338467706"/>
+      </p:ext>
+    </p:extLst>
+  </p:cSld>
+  <p:clrMapOvr>
+    <a:masterClrMapping/>
+  </p:clrMapOvr>
+  <p:timing>
+    <p:tnLst>
+      <p:par>
+        <p:cTn id="1" dur="indefinite" restart="never" nodeType="tmRoot"/>
+      </p:par>
+    </p:tnLst>
+  </p:timing>
+</p:sld>
+</file>
+
+<file path=ppt/slides/slide12.xml><?xml version="1.0" encoding="utf-8"?>
+<p:sld xmlns:a="http://schemas.openxmlformats.org/drawingml/2006/main" xmlns:r="http://schemas.openxmlformats.org/officeDocument/2006/relationships" xmlns:p="http://schemas.openxmlformats.org/presentationml/2006/main">
+  <p:cSld>
+    <p:spTree>
+      <p:nvGrpSpPr>
+        <p:cNvPr id="1" name=""/>
+        <p:cNvGrpSpPr/>
+        <p:nvPr/>
+      </p:nvGrpSpPr>
+      <p:grpSpPr>
+        <a:xfrm>
+          <a:off x="0" y="0"/>
+          <a:ext cx="0" cy="0"/>
+          <a:chOff x="0" y="0"/>
+          <a:chExt cx="0" cy="0"/>
+        </a:xfrm>
+      </p:grpSpPr>
+      <p:sp>
+        <p:nvSpPr>
+          <p:cNvPr id="2" name="Title 1"/>
+          <p:cNvSpPr>
+            <a:spLocks noGrp="1"/>
+          </p:cNvSpPr>
+          <p:nvPr>
+            <p:ph type="title"/>
+          </p:nvPr>
+        </p:nvSpPr>
+        <p:spPr/>
+        <p:txBody>
+          <a:bodyPr/>
+          <a:lstStyle/>
+          <a:p>
+            <a:r>
+              <a:rPr lang="en-US" dirty="0" smtClean="0"/>
+              <a:t>Unit Testing Strategy</a:t>
+            </a:r>
+            <a:endParaRPr lang="en-US" dirty="0"/>
+          </a:p>
+        </p:txBody>
+      </p:sp>
+      <p:pic>
+        <p:nvPicPr>
+          <p:cNvPr id="4" name="Content Placeholder 3"/>
+          <p:cNvPicPr>
+            <a:picLocks noGrp="1" noChangeAspect="1"/>
+          </p:cNvPicPr>
+          <p:nvPr>
+            <p:ph idx="1"/>
+          </p:nvPr>
+        </p:nvPicPr>
+        <p:blipFill>
+          <a:blip r:embed="rId2">
+            <a:extLst>
+              <a:ext uri="{28A0092B-C50C-407E-A947-70E740481C1C}">
+                <a14:useLocalDpi xmlns:a14="http://schemas.microsoft.com/office/drawing/2010/main" val="0"/>
+              </a:ext>
+            </a:extLst>
+          </a:blip>
+          <a:stretch>
+            <a:fillRect/>
+          </a:stretch>
+        </p:blipFill>
+        <p:spPr>
+          <a:xfrm>
+            <a:off x="1744755" y="2720244"/>
+            <a:ext cx="8763450" cy="2451226"/>
+          </a:xfrm>
+        </p:spPr>
+      </p:pic>
+    </p:spTree>
+    <p:extLst>
+      <p:ext uri="{BB962C8B-B14F-4D97-AF65-F5344CB8AC3E}">
+        <p14:creationId xmlns:p14="http://schemas.microsoft.com/office/powerpoint/2010/main" val="3247856267"/>
+      </p:ext>
+    </p:extLst>
+  </p:cSld>
+  <p:clrMapOvr>
+    <a:masterClrMapping/>
+  </p:clrMapOvr>
+  <p:timing>
+    <p:tnLst>
+      <p:par>
+        <p:cTn id="1" dur="indefinite" restart="never" nodeType="tmRoot"/>
+      </p:par>
+    </p:tnLst>
+  </p:timing>
+</p:sld>
+</file>
+
+<file path=ppt/slides/slide13.xml><?xml version="1.0" encoding="utf-8"?>
+<p:sld xmlns:a="http://schemas.openxmlformats.org/drawingml/2006/main" xmlns:r="http://schemas.openxmlformats.org/officeDocument/2006/relationships" xmlns:p="http://schemas.openxmlformats.org/presentationml/2006/main">
+  <p:cSld>
+    <p:spTree>
+      <p:nvGrpSpPr>
+        <p:cNvPr id="1" name=""/>
+        <p:cNvGrpSpPr/>
+        <p:nvPr/>
+      </p:nvGrpSpPr>
+      <p:grpSpPr>
+        <a:xfrm>
+          <a:off x="0" y="0"/>
+          <a:ext cx="0" cy="0"/>
+          <a:chOff x="0" y="0"/>
+          <a:chExt cx="0" cy="0"/>
+        </a:xfrm>
+      </p:grpSpPr>
+      <p:sp>
+        <p:nvSpPr>
+          <p:cNvPr id="2" name="Title 1"/>
+          <p:cNvSpPr>
+            <a:spLocks noGrp="1"/>
+          </p:cNvSpPr>
+          <p:nvPr>
+            <p:ph type="title"/>
+          </p:nvPr>
+        </p:nvSpPr>
+        <p:spPr/>
+        <p:txBody>
+          <a:bodyPr/>
+          <a:lstStyle/>
+          <a:p>
+            <a:r>
+              <a:rPr lang="en-US" dirty="0" smtClean="0"/>
+              <a:t>Unit Testing Strategy</a:t>
+            </a:r>
+            <a:endParaRPr lang="en-US" dirty="0"/>
+          </a:p>
+        </p:txBody>
+      </p:sp>
+      <p:pic>
+        <p:nvPicPr>
+          <p:cNvPr id="5" name="Content Placeholder 4"/>
+          <p:cNvPicPr>
+            <a:picLocks noGrp="1" noChangeAspect="1"/>
+          </p:cNvPicPr>
+          <p:nvPr>
+            <p:ph idx="1"/>
+          </p:nvPr>
+        </p:nvPicPr>
+        <p:blipFill>
+          <a:blip r:embed="rId2">
+            <a:extLst>
+              <a:ext uri="{28A0092B-C50C-407E-A947-70E740481C1C}">
+                <a14:useLocalDpi xmlns:a14="http://schemas.microsoft.com/office/drawing/2010/main" val="0"/>
+              </a:ext>
+            </a:extLst>
+          </a:blip>
+          <a:stretch>
+            <a:fillRect/>
+          </a:stretch>
+        </p:blipFill>
+        <p:spPr>
+          <a:xfrm>
+            <a:off x="3228917" y="2399048"/>
+            <a:ext cx="5795126" cy="3082212"/>
+          </a:xfrm>
+        </p:spPr>
+      </p:pic>
+    </p:spTree>
+    <p:extLst>
+      <p:ext uri="{BB962C8B-B14F-4D97-AF65-F5344CB8AC3E}">
+        <p14:creationId xmlns:p14="http://schemas.microsoft.com/office/powerpoint/2010/main" val="2389979396"/>
+      </p:ext>
+    </p:extLst>
+  </p:cSld>
+  <p:clrMapOvr>
+    <a:masterClrMapping/>
+  </p:clrMapOvr>
+  <p:timing>
+    <p:tnLst>
+      <p:par>
+        <p:cTn id="1" dur="indefinite" restart="never" nodeType="tmRoot"/>
+      </p:par>
+    </p:tnLst>
+  </p:timing>
+</p:sld>
+</file>
+
+<file path=ppt/slides/slide14.xml><?xml version="1.0" encoding="utf-8"?>
+<p:sld xmlns:a="http://schemas.openxmlformats.org/drawingml/2006/main" xmlns:r="http://schemas.openxmlformats.org/officeDocument/2006/relationships" xmlns:p="http://schemas.openxmlformats.org/presentationml/2006/main">
+  <p:cSld>
+    <p:spTree>
+      <p:nvGrpSpPr>
+        <p:cNvPr id="1" name=""/>
+        <p:cNvGrpSpPr/>
+        <p:nvPr/>
+      </p:nvGrpSpPr>
+      <p:grpSpPr>
+        <a:xfrm>
+          <a:off x="0" y="0"/>
+          <a:ext cx="0" cy="0"/>
+          <a:chOff x="0" y="0"/>
+          <a:chExt cx="0" cy="0"/>
+        </a:xfrm>
+      </p:grpSpPr>
+      <p:sp>
+        <p:nvSpPr>
+          <p:cNvPr id="2" name="Title 1"/>
+          <p:cNvSpPr>
+            <a:spLocks noGrp="1"/>
+          </p:cNvSpPr>
+          <p:nvPr>
+            <p:ph type="title"/>
+          </p:nvPr>
+        </p:nvSpPr>
+        <p:spPr/>
+        <p:txBody>
+          <a:bodyPr/>
+          <a:lstStyle/>
+          <a:p>
+            <a:r>
+              <a:rPr lang="en-US" dirty="0" smtClean="0"/>
+              <a:t>Questions?</a:t>
+            </a:r>
+            <a:endParaRPr lang="en-US" dirty="0"/>
+          </a:p>
+        </p:txBody>
+      </p:sp>
+      <p:sp>
+        <p:nvSpPr>
+          <p:cNvPr id="3" name="Content Placeholder 2"/>
+          <p:cNvSpPr>
+            <a:spLocks noGrp="1"/>
+          </p:cNvSpPr>
+          <p:nvPr>
+            <p:ph idx="1"/>
+          </p:nvPr>
+        </p:nvSpPr>
+        <p:spPr/>
+        <p:txBody>
+          <a:bodyPr/>
+          <a:lstStyle/>
+          <a:p>
+            <a:endParaRPr lang="en-US"/>
+          </a:p>
+        </p:txBody>
+      </p:sp>
+    </p:spTree>
+    <p:extLst>
+      <p:ext uri="{BB962C8B-B14F-4D97-AF65-F5344CB8AC3E}">
+        <p14:creationId xmlns:p14="http://schemas.microsoft.com/office/powerpoint/2010/main" val="3036280036"/>
+      </p:ext>
+    </p:extLst>
+  </p:cSld>
+  <p:clrMapOvr>
+    <a:masterClrMapping/>
+  </p:clrMapOvr>
+  <p:timing>
+    <p:tnLst>
+      <p:par>
+        <p:cTn id="1" dur="indefinite" restart="never" nodeType="tmRoot"/>
+      </p:par>
+    </p:tnLst>
+  </p:timing>
+</p:sld>
+</file>
+
 <file path=ppt/slides/slide2.xml><?xml version="1.0" encoding="utf-8"?>
 <p:sld xmlns:a="http://schemas.openxmlformats.org/drawingml/2006/main" xmlns:r="http://schemas.openxmlformats.org/officeDocument/2006/relationships" xmlns:p="http://schemas.openxmlformats.org/presentationml/2006/main">
   <p:cSld>
@@ -3914,11 +4468,7 @@
           <a:p>
             <a:r>
               <a:rPr lang="en-US" dirty="0" smtClean="0"/>
-              <a:t>What </a:t>
-            </a:r>
-            <a:r>
-              <a:rPr lang="en-US" dirty="0" smtClean="0"/>
-              <a:t>Is Unit Testing?</a:t>
+              <a:t>What Is Unit Testing?</a:t>
             </a:r>
             <a:endParaRPr lang="en-US" dirty="0"/>
           </a:p>
@@ -4568,7 +5118,7 @@
           <a:p>
             <a:r>
               <a:rPr lang="en-US" dirty="0" smtClean="0"/>
-              <a:t>Questions?</a:t>
+              <a:t>Black Box Testing</a:t>
             </a:r>
             <a:endParaRPr lang="en-US" dirty="0"/>
           </a:p>
@@ -4586,17 +5136,702 @@
         </p:nvSpPr>
         <p:spPr/>
         <p:txBody>
-          <a:bodyPr/>
-          <a:lstStyle/>
-          <a:p>
-            <a:endParaRPr lang="en-US"/>
+          <a:bodyPr>
+            <a:normAutofit/>
+          </a:bodyPr>
+          <a:lstStyle/>
+          <a:p>
+            <a:r>
+              <a:rPr lang="en-US" b="1" dirty="0"/>
+              <a:t>BLACK BOX TESTING</a:t>
+            </a:r>
+            <a:r>
+              <a:rPr lang="en-US" dirty="0"/>
+              <a:t>, also known as Behavioral Testing, is </a:t>
+            </a:r>
+            <a:r>
+              <a:rPr lang="en-US" dirty="0" smtClean="0"/>
+              <a:t>a</a:t>
+            </a:r>
+            <a:r>
+              <a:rPr lang="en-US" dirty="0"/>
+              <a:t> </a:t>
+            </a:r>
+            <a:r>
+              <a:rPr lang="en-US" dirty="0" smtClean="0"/>
+              <a:t>method in </a:t>
+            </a:r>
+            <a:r>
+              <a:rPr lang="en-US" dirty="0"/>
+              <a:t>which the internal structure/design/implementation of the item being tested is not known to the tester. These tests can be functional or non-functional, </a:t>
+            </a:r>
+            <a:r>
+              <a:rPr lang="en-US" dirty="0" smtClean="0"/>
+              <a:t>though </a:t>
+            </a:r>
+            <a:r>
+              <a:rPr lang="en-US" dirty="0"/>
+              <a:t>usually functional</a:t>
+            </a:r>
+            <a:r>
+              <a:rPr lang="en-US" dirty="0" smtClean="0"/>
+              <a:t>.</a:t>
+            </a:r>
+          </a:p>
+          <a:p>
+            <a:pPr>
+              <a:buFont typeface="Wingdings" panose="05000000000000000000" pitchFamily="2" charset="2"/>
+              <a:buChar char="§"/>
+            </a:pPr>
+            <a:r>
+              <a:rPr lang="en-US" dirty="0" smtClean="0"/>
+              <a:t>  Advantages</a:t>
+            </a:r>
+          </a:p>
+          <a:p>
+            <a:pPr lvl="1">
+              <a:buFont typeface="Wingdings" panose="05000000000000000000" pitchFamily="2" charset="2"/>
+              <a:buChar char="§"/>
+            </a:pPr>
+            <a:r>
+              <a:rPr lang="en-US" dirty="0" smtClean="0"/>
+              <a:t>Tests are done from a user’s point of view and will help in exposing discrepancies in the specifications.</a:t>
+            </a:r>
+          </a:p>
+          <a:p>
+            <a:pPr lvl="1">
+              <a:buFont typeface="Wingdings" panose="05000000000000000000" pitchFamily="2" charset="2"/>
+              <a:buChar char="§"/>
+            </a:pPr>
+            <a:r>
+              <a:rPr lang="en-US" dirty="0" smtClean="0"/>
+              <a:t>Testers don’t need to know implementation details, and testing can be completed by a separate team/individual, helping to eliminate bias</a:t>
+            </a:r>
+          </a:p>
+          <a:p>
+            <a:pPr lvl="1">
+              <a:buFont typeface="Wingdings" panose="05000000000000000000" pitchFamily="2" charset="2"/>
+              <a:buChar char="§"/>
+            </a:pPr>
+            <a:r>
+              <a:rPr lang="en-US" dirty="0" smtClean="0"/>
+              <a:t>Test cases can be designed by testers, analysts, stakeholders, anyone other than the developers</a:t>
+            </a:r>
+          </a:p>
+          <a:p>
+            <a:pPr>
+              <a:buFont typeface="Wingdings" panose="05000000000000000000" pitchFamily="2" charset="2"/>
+              <a:buChar char="§"/>
+            </a:pPr>
+            <a:r>
+              <a:rPr lang="en-US" dirty="0"/>
+              <a:t> </a:t>
+            </a:r>
+            <a:r>
+              <a:rPr lang="en-US" dirty="0" smtClean="0"/>
+              <a:t> Disadvantages</a:t>
+            </a:r>
+            <a:endParaRPr lang="en-US" dirty="0"/>
+          </a:p>
+          <a:p>
+            <a:pPr lvl="1">
+              <a:buFont typeface="Wingdings" panose="05000000000000000000" pitchFamily="2" charset="2"/>
+              <a:buChar char="§"/>
+            </a:pPr>
+            <a:r>
+              <a:rPr lang="en-US" dirty="0" smtClean="0"/>
+              <a:t>The range and complexity of inputs is limited to the testers’ imagination (or a test data generator) and therefore may not exercise all code paths</a:t>
+            </a:r>
+          </a:p>
+          <a:p>
+            <a:pPr lvl="1">
+              <a:buFont typeface="Wingdings" panose="05000000000000000000" pitchFamily="2" charset="2"/>
+              <a:buChar char="§"/>
+            </a:pPr>
+            <a:r>
+              <a:rPr lang="en-US" dirty="0" smtClean="0"/>
+              <a:t>Test cases are difficult or impossible to define properly if specifications are lacking (most of the time)</a:t>
+            </a:r>
           </a:p>
         </p:txBody>
       </p:sp>
     </p:spTree>
     <p:extLst>
       <p:ext uri="{BB962C8B-B14F-4D97-AF65-F5344CB8AC3E}">
-        <p14:creationId xmlns:p14="http://schemas.microsoft.com/office/powerpoint/2010/main" val="3036280036"/>
+        <p14:creationId xmlns:p14="http://schemas.microsoft.com/office/powerpoint/2010/main" val="1436816524"/>
+      </p:ext>
+    </p:extLst>
+  </p:cSld>
+  <p:clrMapOvr>
+    <a:masterClrMapping/>
+  </p:clrMapOvr>
+  <p:timing>
+    <p:tnLst>
+      <p:par>
+        <p:cTn id="1" dur="indefinite" restart="never" nodeType="tmRoot"/>
+      </p:par>
+    </p:tnLst>
+  </p:timing>
+</p:sld>
+</file>
+
+<file path=ppt/slides/slide7.xml><?xml version="1.0" encoding="utf-8"?>
+<p:sld xmlns:a="http://schemas.openxmlformats.org/drawingml/2006/main" xmlns:r="http://schemas.openxmlformats.org/officeDocument/2006/relationships" xmlns:p="http://schemas.openxmlformats.org/presentationml/2006/main">
+  <p:cSld>
+    <p:spTree>
+      <p:nvGrpSpPr>
+        <p:cNvPr id="1" name=""/>
+        <p:cNvGrpSpPr/>
+        <p:nvPr/>
+      </p:nvGrpSpPr>
+      <p:grpSpPr>
+        <a:xfrm>
+          <a:off x="0" y="0"/>
+          <a:ext cx="0" cy="0"/>
+          <a:chOff x="0" y="0"/>
+          <a:chExt cx="0" cy="0"/>
+        </a:xfrm>
+      </p:grpSpPr>
+      <p:sp>
+        <p:nvSpPr>
+          <p:cNvPr id="2" name="Title 1"/>
+          <p:cNvSpPr>
+            <a:spLocks noGrp="1"/>
+          </p:cNvSpPr>
+          <p:nvPr>
+            <p:ph type="title"/>
+          </p:nvPr>
+        </p:nvSpPr>
+        <p:spPr/>
+        <p:txBody>
+          <a:bodyPr/>
+          <a:lstStyle/>
+          <a:p>
+            <a:r>
+              <a:rPr lang="en-US" dirty="0" smtClean="0"/>
+              <a:t>White</a:t>
+            </a:r>
+            <a:r>
+              <a:rPr lang="en-US" dirty="0" smtClean="0"/>
+              <a:t> Box Testing</a:t>
+            </a:r>
+            <a:endParaRPr lang="en-US" dirty="0"/>
+          </a:p>
+        </p:txBody>
+      </p:sp>
+      <p:sp>
+        <p:nvSpPr>
+          <p:cNvPr id="3" name="Content Placeholder 2"/>
+          <p:cNvSpPr>
+            <a:spLocks noGrp="1"/>
+          </p:cNvSpPr>
+          <p:nvPr>
+            <p:ph idx="1"/>
+          </p:nvPr>
+        </p:nvSpPr>
+        <p:spPr/>
+        <p:txBody>
+          <a:bodyPr>
+            <a:normAutofit/>
+          </a:bodyPr>
+          <a:lstStyle/>
+          <a:p>
+            <a:r>
+              <a:rPr lang="en-US" b="1" dirty="0"/>
+              <a:t>WHITE BOX TESTING </a:t>
+            </a:r>
+            <a:r>
+              <a:rPr lang="en-US" dirty="0" smtClean="0"/>
+              <a:t>is </a:t>
+            </a:r>
+            <a:r>
+              <a:rPr lang="en-US" dirty="0"/>
+              <a:t>a </a:t>
+            </a:r>
+            <a:r>
+              <a:rPr lang="en-US" dirty="0" smtClean="0"/>
+              <a:t>method in </a:t>
+            </a:r>
+            <a:r>
+              <a:rPr lang="en-US" dirty="0"/>
+              <a:t>which the internal structure/design/implementation of the item being tested is known to the tester. The tester chooses inputs to exercise paths through the code and determines the appropriate outputs. </a:t>
+            </a:r>
+            <a:endParaRPr lang="en-US" dirty="0" smtClean="0"/>
+          </a:p>
+          <a:p>
+            <a:pPr>
+              <a:buFont typeface="Wingdings" panose="05000000000000000000" pitchFamily="2" charset="2"/>
+              <a:buChar char="§"/>
+            </a:pPr>
+            <a:r>
+              <a:rPr lang="en-US" dirty="0"/>
+              <a:t> </a:t>
+            </a:r>
+            <a:r>
+              <a:rPr lang="en-US" dirty="0" smtClean="0"/>
+              <a:t> Advantages</a:t>
+            </a:r>
+          </a:p>
+          <a:p>
+            <a:pPr lvl="1">
+              <a:buFont typeface="Wingdings" panose="05000000000000000000" pitchFamily="2" charset="2"/>
+              <a:buChar char="§"/>
+            </a:pPr>
+            <a:r>
+              <a:rPr lang="en-US" dirty="0" smtClean="0"/>
+              <a:t>Testing can be performed at earlier stages, perhaps before code is even written</a:t>
+            </a:r>
+          </a:p>
+          <a:p>
+            <a:pPr lvl="1">
+              <a:buFont typeface="Wingdings" panose="05000000000000000000" pitchFamily="2" charset="2"/>
+              <a:buChar char="§"/>
+            </a:pPr>
+            <a:r>
+              <a:rPr lang="en-US" dirty="0" smtClean="0"/>
+              <a:t>Testing is more thorough and succinct</a:t>
+            </a:r>
+          </a:p>
+          <a:p>
+            <a:pPr lvl="1">
+              <a:buFont typeface="Wingdings" panose="05000000000000000000" pitchFamily="2" charset="2"/>
+              <a:buChar char="§"/>
+            </a:pPr>
+            <a:r>
+              <a:rPr lang="en-US" dirty="0" smtClean="0"/>
+              <a:t>Test efficacy can be measured empirically with code coverage </a:t>
+            </a:r>
+          </a:p>
+          <a:p>
+            <a:pPr>
+              <a:buFont typeface="Wingdings" panose="05000000000000000000" pitchFamily="2" charset="2"/>
+              <a:buChar char="§"/>
+            </a:pPr>
+            <a:r>
+              <a:rPr lang="en-US" dirty="0"/>
+              <a:t> </a:t>
+            </a:r>
+            <a:r>
+              <a:rPr lang="en-US" dirty="0" smtClean="0"/>
+              <a:t> Disadvantages</a:t>
+            </a:r>
+            <a:endParaRPr lang="en-US" dirty="0"/>
+          </a:p>
+          <a:p>
+            <a:pPr lvl="1">
+              <a:buFont typeface="Wingdings" panose="05000000000000000000" pitchFamily="2" charset="2"/>
+              <a:buChar char="§"/>
+            </a:pPr>
+            <a:r>
+              <a:rPr lang="en-US" dirty="0" smtClean="0"/>
+              <a:t>Skilled testers are required; most likely the same developers that wrote the software</a:t>
+            </a:r>
+          </a:p>
+          <a:p>
+            <a:pPr lvl="1">
+              <a:buFont typeface="Wingdings" panose="05000000000000000000" pitchFamily="2" charset="2"/>
+              <a:buChar char="§"/>
+            </a:pPr>
+            <a:r>
+              <a:rPr lang="en-US" dirty="0" smtClean="0"/>
+              <a:t>When the code changes, so must the tests</a:t>
+            </a:r>
+          </a:p>
+          <a:p>
+            <a:pPr lvl="1">
+              <a:buFont typeface="Wingdings" panose="05000000000000000000" pitchFamily="2" charset="2"/>
+              <a:buChar char="§"/>
+            </a:pPr>
+            <a:r>
+              <a:rPr lang="en-US" dirty="0" smtClean="0"/>
+              <a:t>Deriving business value may be difficult for code which won’t be around long, or which is not ‘line of business’</a:t>
+            </a:r>
+          </a:p>
+        </p:txBody>
+      </p:sp>
+    </p:spTree>
+    <p:extLst>
+      <p:ext uri="{BB962C8B-B14F-4D97-AF65-F5344CB8AC3E}">
+        <p14:creationId xmlns:p14="http://schemas.microsoft.com/office/powerpoint/2010/main" val="1897704781"/>
+      </p:ext>
+    </p:extLst>
+  </p:cSld>
+  <p:clrMapOvr>
+    <a:masterClrMapping/>
+  </p:clrMapOvr>
+  <p:timing>
+    <p:tnLst>
+      <p:par>
+        <p:cTn id="1" dur="indefinite" restart="never" nodeType="tmRoot"/>
+      </p:par>
+    </p:tnLst>
+  </p:timing>
+</p:sld>
+</file>
+
+<file path=ppt/slides/slide8.xml><?xml version="1.0" encoding="utf-8"?>
+<p:sld xmlns:a="http://schemas.openxmlformats.org/drawingml/2006/main" xmlns:r="http://schemas.openxmlformats.org/officeDocument/2006/relationships" xmlns:p="http://schemas.openxmlformats.org/presentationml/2006/main">
+  <p:cSld>
+    <p:spTree>
+      <p:nvGrpSpPr>
+        <p:cNvPr id="1" name=""/>
+        <p:cNvGrpSpPr/>
+        <p:nvPr/>
+      </p:nvGrpSpPr>
+      <p:grpSpPr>
+        <a:xfrm>
+          <a:off x="0" y="0"/>
+          <a:ext cx="0" cy="0"/>
+          <a:chOff x="0" y="0"/>
+          <a:chExt cx="0" cy="0"/>
+        </a:xfrm>
+      </p:grpSpPr>
+      <p:sp>
+        <p:nvSpPr>
+          <p:cNvPr id="2" name="Title 1"/>
+          <p:cNvSpPr>
+            <a:spLocks noGrp="1"/>
+          </p:cNvSpPr>
+          <p:nvPr>
+            <p:ph type="title"/>
+          </p:nvPr>
+        </p:nvSpPr>
+        <p:spPr/>
+        <p:txBody>
+          <a:bodyPr/>
+          <a:lstStyle/>
+          <a:p>
+            <a:r>
+              <a:rPr lang="en-US" dirty="0" smtClean="0"/>
+              <a:t>Applying White Box/Black Box Methods</a:t>
+            </a:r>
+            <a:endParaRPr lang="en-US" dirty="0"/>
+          </a:p>
+        </p:txBody>
+      </p:sp>
+      <p:sp>
+        <p:nvSpPr>
+          <p:cNvPr id="3" name="Content Placeholder 2"/>
+          <p:cNvSpPr>
+            <a:spLocks noGrp="1"/>
+          </p:cNvSpPr>
+          <p:nvPr>
+            <p:ph idx="1"/>
+          </p:nvPr>
+        </p:nvSpPr>
+        <p:spPr/>
+        <p:txBody>
+          <a:bodyPr>
+            <a:normAutofit lnSpcReduction="10000"/>
+          </a:bodyPr>
+          <a:lstStyle/>
+          <a:p>
+            <a:pPr>
+              <a:buFont typeface="Wingdings" panose="05000000000000000000" pitchFamily="2" charset="2"/>
+              <a:buChar char="§"/>
+            </a:pPr>
+            <a:r>
+              <a:rPr lang="en-US" sz="2200" dirty="0"/>
+              <a:t>  Generally speaking, use a white box methodology for unit tests and black box for everything else</a:t>
+            </a:r>
+          </a:p>
+          <a:p>
+            <a:pPr>
+              <a:buFont typeface="Wingdings" panose="05000000000000000000" pitchFamily="2" charset="2"/>
+              <a:buChar char="§"/>
+            </a:pPr>
+            <a:r>
+              <a:rPr lang="en-US" sz="2200" dirty="0"/>
+              <a:t> </a:t>
+            </a:r>
+            <a:r>
+              <a:rPr lang="en-US" sz="2200" dirty="0"/>
+              <a:t> Less generally speaking:</a:t>
+            </a:r>
+          </a:p>
+          <a:p>
+            <a:pPr lvl="1">
+              <a:buFont typeface="Wingdings" panose="05000000000000000000" pitchFamily="2" charset="2"/>
+              <a:buChar char="§"/>
+            </a:pPr>
+            <a:r>
+              <a:rPr lang="en-US" sz="1900" dirty="0"/>
+              <a:t>Write ‘white box’ unit tests for shared code (libraries, </a:t>
+            </a:r>
+            <a:r>
+              <a:rPr lang="en-US" sz="1900" dirty="0" err="1"/>
+              <a:t>etc</a:t>
+            </a:r>
+            <a:r>
+              <a:rPr lang="en-US" sz="1900" dirty="0"/>
+              <a:t>)</a:t>
+            </a:r>
+          </a:p>
+          <a:p>
+            <a:pPr lvl="1">
+              <a:buFont typeface="Wingdings" panose="05000000000000000000" pitchFamily="2" charset="2"/>
+              <a:buChar char="§"/>
+            </a:pPr>
+            <a:r>
+              <a:rPr lang="en-US" sz="1900" dirty="0"/>
+              <a:t>Use code coverage as a metric to test what you haven’t tested (shoot for 90-95%)</a:t>
+            </a:r>
+          </a:p>
+          <a:p>
+            <a:pPr lvl="1">
+              <a:buFont typeface="Wingdings" panose="05000000000000000000" pitchFamily="2" charset="2"/>
+              <a:buChar char="§"/>
+            </a:pPr>
+            <a:r>
+              <a:rPr lang="en-US" sz="1900" dirty="0"/>
+              <a:t>Try to limit the complexity of software layers containing business logic so that integration testing has a higher likelihood of covering all code paths (eliminating the need to unit test business logic)</a:t>
+            </a:r>
+          </a:p>
+          <a:p>
+            <a:pPr lvl="1">
+              <a:buFont typeface="Wingdings" panose="05000000000000000000" pitchFamily="2" charset="2"/>
+              <a:buChar char="§"/>
+            </a:pPr>
+            <a:r>
+              <a:rPr lang="en-US" sz="1900" dirty="0"/>
+              <a:t>Use tests as feedback for your code:</a:t>
+            </a:r>
+          </a:p>
+          <a:p>
+            <a:pPr lvl="2">
+              <a:buFont typeface="Wingdings" panose="05000000000000000000" pitchFamily="2" charset="2"/>
+              <a:buChar char="§"/>
+            </a:pPr>
+            <a:r>
+              <a:rPr lang="en-US" sz="1800" dirty="0" smtClean="0"/>
+              <a:t>Having trouble writing a test to hit a particular branch? Maybe you don’t need that branch.</a:t>
+            </a:r>
+          </a:p>
+          <a:p>
+            <a:pPr lvl="2">
+              <a:buFont typeface="Wingdings" panose="05000000000000000000" pitchFamily="2" charset="2"/>
+              <a:buChar char="§"/>
+            </a:pPr>
+            <a:r>
+              <a:rPr lang="en-US" sz="1800" dirty="0" smtClean="0"/>
+              <a:t>Are a lot of tests passing through the same branch? Maybe you should move that logic elsewhere.</a:t>
+            </a:r>
+          </a:p>
+          <a:p>
+            <a:pPr lvl="2">
+              <a:buFont typeface="Wingdings" panose="05000000000000000000" pitchFamily="2" charset="2"/>
+              <a:buChar char="§"/>
+            </a:pPr>
+            <a:r>
+              <a:rPr lang="en-US" sz="1800" dirty="0" smtClean="0"/>
+              <a:t>Finding yourself testing things that have already been tested for another class? Maybe you’re doing too much error handling.</a:t>
+            </a:r>
+          </a:p>
+          <a:p>
+            <a:pPr lvl="1">
+              <a:buFont typeface="Wingdings" panose="05000000000000000000" pitchFamily="2" charset="2"/>
+              <a:buChar char="§"/>
+            </a:pPr>
+            <a:endParaRPr lang="en-US" sz="2400" dirty="0" smtClean="0"/>
+          </a:p>
+          <a:p>
+            <a:pPr>
+              <a:buFont typeface="Wingdings" panose="05000000000000000000" pitchFamily="2" charset="2"/>
+              <a:buChar char="§"/>
+            </a:pPr>
+            <a:endParaRPr lang="en-US" sz="3200" dirty="0" smtClean="0"/>
+          </a:p>
+        </p:txBody>
+      </p:sp>
+    </p:spTree>
+    <p:extLst>
+      <p:ext uri="{BB962C8B-B14F-4D97-AF65-F5344CB8AC3E}">
+        <p14:creationId xmlns:p14="http://schemas.microsoft.com/office/powerpoint/2010/main" val="1777785950"/>
+      </p:ext>
+    </p:extLst>
+  </p:cSld>
+  <p:clrMapOvr>
+    <a:masterClrMapping/>
+  </p:clrMapOvr>
+  <p:timing>
+    <p:tnLst>
+      <p:par>
+        <p:cTn id="1" dur="indefinite" restart="never" nodeType="tmRoot"/>
+      </p:par>
+    </p:tnLst>
+  </p:timing>
+</p:sld>
+</file>
+
+<file path=ppt/slides/slide9.xml><?xml version="1.0" encoding="utf-8"?>
+<p:sld xmlns:a="http://schemas.openxmlformats.org/drawingml/2006/main" xmlns:r="http://schemas.openxmlformats.org/officeDocument/2006/relationships" xmlns:p="http://schemas.openxmlformats.org/presentationml/2006/main">
+  <p:cSld>
+    <p:spTree>
+      <p:nvGrpSpPr>
+        <p:cNvPr id="1" name=""/>
+        <p:cNvGrpSpPr/>
+        <p:nvPr/>
+      </p:nvGrpSpPr>
+      <p:grpSpPr>
+        <a:xfrm>
+          <a:off x="0" y="0"/>
+          <a:ext cx="0" cy="0"/>
+          <a:chOff x="0" y="0"/>
+          <a:chExt cx="0" cy="0"/>
+        </a:xfrm>
+      </p:grpSpPr>
+      <p:sp>
+        <p:nvSpPr>
+          <p:cNvPr id="2" name="Title 1"/>
+          <p:cNvSpPr>
+            <a:spLocks noGrp="1"/>
+          </p:cNvSpPr>
+          <p:nvPr>
+            <p:ph type="title"/>
+          </p:nvPr>
+        </p:nvSpPr>
+        <p:spPr/>
+        <p:txBody>
+          <a:bodyPr/>
+          <a:lstStyle/>
+          <a:p>
+            <a:r>
+              <a:rPr lang="en-US" dirty="0" smtClean="0"/>
+              <a:t>Applying White Box/Black Box Methods</a:t>
+            </a:r>
+            <a:endParaRPr lang="en-US" dirty="0"/>
+          </a:p>
+        </p:txBody>
+      </p:sp>
+      <p:sp>
+        <p:nvSpPr>
+          <p:cNvPr id="3" name="Content Placeholder 2"/>
+          <p:cNvSpPr>
+            <a:spLocks noGrp="1"/>
+          </p:cNvSpPr>
+          <p:nvPr>
+            <p:ph idx="1"/>
+          </p:nvPr>
+        </p:nvSpPr>
+        <p:spPr/>
+        <p:txBody>
+          <a:bodyPr>
+            <a:normAutofit/>
+          </a:bodyPr>
+          <a:lstStyle/>
+          <a:p>
+            <a:pPr marL="0" indent="0">
+              <a:buNone/>
+            </a:pPr>
+            <a:endParaRPr lang="en-US" sz="3200" dirty="0" smtClean="0"/>
+          </a:p>
+          <a:p>
+            <a:pPr marL="0" indent="0">
+              <a:buNone/>
+            </a:pPr>
+            <a:endParaRPr lang="en-US" sz="3200" dirty="0"/>
+          </a:p>
+          <a:p>
+            <a:pPr marL="0" indent="0">
+              <a:buNone/>
+            </a:pPr>
+            <a:endParaRPr lang="en-US" sz="3200" dirty="0" smtClean="0"/>
+          </a:p>
+          <a:p>
+            <a:pPr marL="0" indent="0">
+              <a:buNone/>
+            </a:pPr>
+            <a:endParaRPr lang="en-US" sz="3200" dirty="0" smtClean="0"/>
+          </a:p>
+          <a:p>
+            <a:pPr marL="0" indent="0">
+              <a:buNone/>
+            </a:pPr>
+            <a:r>
+              <a:rPr lang="en-US" sz="3200" dirty="0" smtClean="0"/>
+              <a:t>  </a:t>
+            </a:r>
+          </a:p>
+          <a:p>
+            <a:pPr>
+              <a:buFont typeface="Wingdings" panose="05000000000000000000" pitchFamily="2" charset="2"/>
+              <a:buChar char="§"/>
+            </a:pPr>
+            <a:r>
+              <a:rPr lang="en-US" dirty="0"/>
+              <a:t> </a:t>
+            </a:r>
+            <a:r>
+              <a:rPr lang="en-US" dirty="0"/>
+              <a:t> Use your head, be pragmatic, let go of dogmatic thought patterns, and focus on deriving business value</a:t>
+            </a:r>
+          </a:p>
+        </p:txBody>
+      </p:sp>
+      <p:pic>
+        <p:nvPicPr>
+          <p:cNvPr id="4" name="Picture 3"/>
+          <p:cNvPicPr>
+            <a:picLocks noChangeAspect="1"/>
+          </p:cNvPicPr>
+          <p:nvPr/>
+        </p:nvPicPr>
+        <p:blipFill>
+          <a:blip r:embed="rId2">
+            <a:extLst>
+              <a:ext uri="{28A0092B-C50C-407E-A947-70E740481C1C}">
+                <a14:useLocalDpi xmlns:a14="http://schemas.microsoft.com/office/drawing/2010/main" val="0"/>
+              </a:ext>
+            </a:extLst>
+          </a:blip>
+          <a:stretch>
+            <a:fillRect/>
+          </a:stretch>
+        </p:blipFill>
+        <p:spPr>
+          <a:xfrm>
+            <a:off x="1692441" y="1903496"/>
+            <a:ext cx="4612106" cy="2594310"/>
+          </a:xfrm>
+          <a:prstGeom prst="rect">
+            <a:avLst/>
+          </a:prstGeom>
+        </p:spPr>
+      </p:pic>
+      <p:pic>
+        <p:nvPicPr>
+          <p:cNvPr id="5" name="Picture 4"/>
+          <p:cNvPicPr>
+            <a:picLocks noChangeAspect="1"/>
+          </p:cNvPicPr>
+          <p:nvPr/>
+        </p:nvPicPr>
+        <p:blipFill>
+          <a:blip r:embed="rId3">
+            <a:extLst>
+              <a:ext uri="{28A0092B-C50C-407E-A947-70E740481C1C}">
+                <a14:useLocalDpi xmlns:a14="http://schemas.microsoft.com/office/drawing/2010/main" val="0"/>
+              </a:ext>
+            </a:extLst>
+          </a:blip>
+          <a:stretch>
+            <a:fillRect/>
+          </a:stretch>
+        </p:blipFill>
+        <p:spPr>
+          <a:xfrm>
+            <a:off x="7523748" y="1900589"/>
+            <a:ext cx="2597217" cy="2597217"/>
+          </a:xfrm>
+          <a:prstGeom prst="rect">
+            <a:avLst/>
+          </a:prstGeom>
+        </p:spPr>
+      </p:pic>
+    </p:spTree>
+    <p:extLst>
+      <p:ext uri="{BB962C8B-B14F-4D97-AF65-F5344CB8AC3E}">
+        <p14:creationId xmlns:p14="http://schemas.microsoft.com/office/powerpoint/2010/main" val="2433171062"/>
       </p:ext>
     </p:extLst>
   </p:cSld>

</xml_diff>